<commit_message>
Added a design slide to final presentation
</commit_message>
<xml_diff>
--- a/Presentation/FINAL.pptx
+++ b/Presentation/FINAL.pptx
@@ -9,9 +9,10 @@
     <p:sldId id="257" r:id="rId3"/>
     <p:sldId id="258" r:id="rId4"/>
     <p:sldId id="262" r:id="rId5"/>
-    <p:sldId id="263" r:id="rId6"/>
-    <p:sldId id="260" r:id="rId7"/>
-    <p:sldId id="259" r:id="rId8"/>
+    <p:sldId id="264" r:id="rId6"/>
+    <p:sldId id="263" r:id="rId7"/>
+    <p:sldId id="260" r:id="rId8"/>
+    <p:sldId id="259" r:id="rId9"/>
   </p:sldIdLst>
   <p:sldSz cx="12192000" cy="6858000"/>
   <p:notesSz cx="6858000" cy="9144000"/>
@@ -6200,7 +6201,6 @@
               <a:rPr lang="en-US" dirty="0" smtClean="0"/>
               <a:t>PHP 7</a:t>
             </a:r>
-            <a:endParaRPr lang="en-US" dirty="0" smtClean="0"/>
           </a:p>
           <a:p>
             <a:r>
@@ -6218,6 +6218,12 @@
             <a:r>
               <a:rPr lang="en-US" dirty="0" smtClean="0"/>
               <a:t>CSS3</a:t>
+            </a:r>
+          </a:p>
+          <a:p>
+            <a:r>
+              <a:rPr lang="en-US" dirty="0" err="1" smtClean="0"/>
+              <a:t>Javascript</a:t>
             </a:r>
             <a:endParaRPr lang="en-US" dirty="0" smtClean="0"/>
           </a:p>
@@ -6498,57 +6504,58 @@
           <a:p>
             <a:r>
               <a:rPr lang="en-US" dirty="0" smtClean="0"/>
-              <a:t>Six MySQL Tables</a:t>
+              <a:t>Two Types of Users</a:t>
             </a:r>
           </a:p>
           <a:p>
             <a:pPr lvl="1"/>
             <a:r>
+              <a:rPr lang="en-US" dirty="0"/>
+              <a:t>N</a:t>
+            </a:r>
+            <a:r>
               <a:rPr lang="en-US" dirty="0" smtClean="0"/>
-              <a:t>Users (List of Users, Admin or Not, Banned or Not)</a:t>
-            </a:r>
+              <a:t>ormal User</a:t>
+            </a:r>
+          </a:p>
+          <a:p>
+            <a:pPr lvl="2"/>
+            <a:r>
+              <a:rPr lang="en-US" dirty="0" smtClean="0"/>
+              <a:t>Can be both a worker and a customer</a:t>
+            </a:r>
+          </a:p>
+          <a:p>
+            <a:pPr lvl="2"/>
+            <a:r>
+              <a:rPr lang="en-US" dirty="0" smtClean="0"/>
+              <a:t>Workers are those who complete jobs the customer </a:t>
+            </a:r>
+            <a:r>
+              <a:rPr lang="en-US" smtClean="0"/>
+              <a:t>users submit</a:t>
+            </a:r>
+            <a:endParaRPr lang="en-US" dirty="0" smtClean="0"/>
           </a:p>
           <a:p>
             <a:pPr lvl="1"/>
             <a:r>
-              <a:rPr lang="en-US" dirty="0" err="1" smtClean="0"/>
-              <a:t>UserInfo</a:t>
-            </a:r>
-            <a:r>
               <a:rPr lang="en-US" dirty="0" smtClean="0"/>
-              <a:t> (Address, Phone Number, Email, etc.)</a:t>
-            </a:r>
-          </a:p>
-          <a:p>
-            <a:pPr lvl="1"/>
+              <a:t>Administrator User</a:t>
+            </a:r>
+          </a:p>
+          <a:p>
+            <a:pPr lvl="2"/>
             <a:r>
               <a:rPr lang="en-US" dirty="0" smtClean="0"/>
-              <a:t>Jobs (List of submitted jobs, Date, Completed or Not)</a:t>
-            </a:r>
-          </a:p>
-          <a:p>
-            <a:pPr lvl="1"/>
+              <a:t>Is able to view all users, jobs, and user messages</a:t>
+            </a:r>
+          </a:p>
+          <a:p>
+            <a:pPr lvl="2"/>
             <a:r>
               <a:rPr lang="en-US" dirty="0" smtClean="0"/>
-              <a:t>Reviews (Reviews for each Job)</a:t>
-            </a:r>
-          </a:p>
-          <a:p>
-            <a:pPr lvl="1"/>
-            <a:r>
-              <a:rPr lang="en-US" dirty="0" smtClean="0"/>
-              <a:t>Alerts (Three Booleans for Accepted, Reviewed, Admin message)</a:t>
-            </a:r>
-          </a:p>
-          <a:p>
-            <a:pPr lvl="1"/>
-            <a:r>
-              <a:rPr lang="en-US" dirty="0" err="1" smtClean="0"/>
-              <a:t>AdminMessages</a:t>
-            </a:r>
-            <a:r>
-              <a:rPr lang="en-US" dirty="0" smtClean="0"/>
-              <a:t> (Stores messages sent to Admins)</a:t>
+              <a:t>Also has normal user functionality</a:t>
             </a:r>
             <a:endParaRPr lang="en-US" dirty="0"/>
           </a:p>
@@ -6557,7 +6564,7 @@
     </p:spTree>
     <p:extLst>
       <p:ext uri="{BB962C8B-B14F-4D97-AF65-F5344CB8AC3E}">
-        <p14:creationId xmlns:p14="http://schemas.microsoft.com/office/powerpoint/2010/main" val="1985653810"/>
+        <p14:creationId xmlns:p14="http://schemas.microsoft.com/office/powerpoint/2010/main" val="4069996597"/>
       </p:ext>
     </p:extLst>
   </p:cSld>
@@ -6601,6 +6608,132 @@
           <a:p>
             <a:r>
               <a:rPr lang="en-US" dirty="0" smtClean="0"/>
+              <a:t>Design</a:t>
+            </a:r>
+            <a:endParaRPr lang="en-US" dirty="0"/>
+          </a:p>
+        </p:txBody>
+      </p:sp>
+      <p:sp>
+        <p:nvSpPr>
+          <p:cNvPr id="3" name="Content Placeholder 2"/>
+          <p:cNvSpPr>
+            <a:spLocks noGrp="1"/>
+          </p:cNvSpPr>
+          <p:nvPr>
+            <p:ph idx="1"/>
+          </p:nvPr>
+        </p:nvSpPr>
+        <p:spPr/>
+        <p:txBody>
+          <a:bodyPr/>
+          <a:lstStyle/>
+          <a:p>
+            <a:r>
+              <a:rPr lang="en-US" dirty="0" smtClean="0"/>
+              <a:t>Six MySQL Tables</a:t>
+            </a:r>
+          </a:p>
+          <a:p>
+            <a:pPr lvl="1"/>
+            <a:r>
+              <a:rPr lang="en-US" dirty="0" smtClean="0"/>
+              <a:t>Users (List of Users, Admin or Not, Banned or Not)</a:t>
+            </a:r>
+          </a:p>
+          <a:p>
+            <a:pPr lvl="1"/>
+            <a:r>
+              <a:rPr lang="en-US" dirty="0" err="1" smtClean="0"/>
+              <a:t>UserInfo</a:t>
+            </a:r>
+            <a:r>
+              <a:rPr lang="en-US" dirty="0" smtClean="0"/>
+              <a:t> (Address, Phone Number, Email, etc.)</a:t>
+            </a:r>
+          </a:p>
+          <a:p>
+            <a:pPr lvl="1"/>
+            <a:r>
+              <a:rPr lang="en-US" dirty="0" smtClean="0"/>
+              <a:t>Jobs (List of submitted jobs, Date, Completed or Not)</a:t>
+            </a:r>
+          </a:p>
+          <a:p>
+            <a:pPr lvl="1"/>
+            <a:r>
+              <a:rPr lang="en-US" dirty="0" smtClean="0"/>
+              <a:t>Reviews (Reviews for each Job)</a:t>
+            </a:r>
+          </a:p>
+          <a:p>
+            <a:pPr lvl="1"/>
+            <a:r>
+              <a:rPr lang="en-US" dirty="0" smtClean="0"/>
+              <a:t>Alerts (Three Booleans for Accepted, Reviewed, Admin message)</a:t>
+            </a:r>
+          </a:p>
+          <a:p>
+            <a:pPr lvl="1"/>
+            <a:r>
+              <a:rPr lang="en-US" dirty="0" err="1" smtClean="0"/>
+              <a:t>AdminMessages</a:t>
+            </a:r>
+            <a:r>
+              <a:rPr lang="en-US" dirty="0" smtClean="0"/>
+              <a:t> (Stores messages sent to Admins)</a:t>
+            </a:r>
+            <a:endParaRPr lang="en-US" dirty="0"/>
+          </a:p>
+        </p:txBody>
+      </p:sp>
+    </p:spTree>
+    <p:extLst>
+      <p:ext uri="{BB962C8B-B14F-4D97-AF65-F5344CB8AC3E}">
+        <p14:creationId xmlns:p14="http://schemas.microsoft.com/office/powerpoint/2010/main" val="1985653810"/>
+      </p:ext>
+    </p:extLst>
+  </p:cSld>
+  <p:clrMapOvr>
+    <a:masterClrMapping/>
+  </p:clrMapOvr>
+</p:sld>
+</file>
+
+<file path=ppt/slides/slide7.xml><?xml version="1.0" encoding="utf-8"?>
+<p:sld xmlns:a="http://schemas.openxmlformats.org/drawingml/2006/main" xmlns:r="http://schemas.openxmlformats.org/officeDocument/2006/relationships" xmlns:p="http://schemas.openxmlformats.org/presentationml/2006/main">
+  <p:cSld>
+    <p:spTree>
+      <p:nvGrpSpPr>
+        <p:cNvPr id="1" name=""/>
+        <p:cNvGrpSpPr/>
+        <p:nvPr/>
+      </p:nvGrpSpPr>
+      <p:grpSpPr>
+        <a:xfrm>
+          <a:off x="0" y="0"/>
+          <a:ext cx="0" cy="0"/>
+          <a:chOff x="0" y="0"/>
+          <a:chExt cx="0" cy="0"/>
+        </a:xfrm>
+      </p:grpSpPr>
+      <p:sp>
+        <p:nvSpPr>
+          <p:cNvPr id="2" name="Title 1"/>
+          <p:cNvSpPr>
+            <a:spLocks noGrp="1"/>
+          </p:cNvSpPr>
+          <p:nvPr>
+            <p:ph type="title"/>
+          </p:nvPr>
+        </p:nvSpPr>
+        <p:spPr/>
+        <p:txBody>
+          <a:bodyPr/>
+          <a:lstStyle/>
+          <a:p>
+            <a:r>
+              <a:rPr lang="en-US" dirty="0" smtClean="0"/>
               <a:t>Today’s Demo</a:t>
             </a:r>
             <a:endParaRPr lang="en-US" dirty="0"/>
@@ -6626,11 +6759,7 @@
           <a:p>
             <a:r>
               <a:rPr lang="en-US" dirty="0" smtClean="0"/>
-              <a:t>User </a:t>
-            </a:r>
-            <a:r>
-              <a:rPr lang="en-US" dirty="0" smtClean="0"/>
-              <a:t>Registration/Login</a:t>
+              <a:t>User Registration/Login</a:t>
             </a:r>
           </a:p>
           <a:p>
@@ -6638,7 +6767,6 @@
               <a:rPr lang="en-US" dirty="0" smtClean="0"/>
               <a:t>User Home Page</a:t>
             </a:r>
-            <a:endParaRPr lang="en-US" dirty="0" smtClean="0"/>
           </a:p>
           <a:p>
             <a:r>
@@ -6651,7 +6779,6 @@
               <a:rPr lang="en-US" dirty="0" smtClean="0"/>
               <a:t>Job Search/Acceptance</a:t>
             </a:r>
-            <a:endParaRPr lang="en-US" dirty="0" smtClean="0"/>
           </a:p>
           <a:p>
             <a:r>
@@ -6670,7 +6797,6 @@
               <a:rPr lang="en-US" dirty="0" smtClean="0"/>
               <a:t>Job Completion</a:t>
             </a:r>
-            <a:endParaRPr lang="en-US" dirty="0" smtClean="0"/>
           </a:p>
           <a:p>
             <a:r>
@@ -6689,21 +6815,18 @@
               <a:rPr lang="en-US" dirty="0" smtClean="0"/>
               <a:t>Contact Admins</a:t>
             </a:r>
-            <a:endParaRPr lang="en-US" dirty="0" smtClean="0"/>
           </a:p>
           <a:p>
             <a:r>
               <a:rPr lang="en-US" dirty="0" smtClean="0"/>
               <a:t>Admin Panel</a:t>
             </a:r>
-            <a:endParaRPr lang="en-US" dirty="0" smtClean="0"/>
           </a:p>
           <a:p>
             <a:r>
               <a:rPr lang="en-US" dirty="0" smtClean="0"/>
               <a:t>Banning/Unbanning Users</a:t>
             </a:r>
-            <a:endParaRPr lang="en-US" dirty="0" smtClean="0"/>
           </a:p>
         </p:txBody>
       </p:sp>
@@ -6720,7 +6843,7 @@
 </p:sld>
 </file>
 
-<file path=ppt/slides/slide7.xml><?xml version="1.0" encoding="utf-8"?>
+<file path=ppt/slides/slide8.xml><?xml version="1.0" encoding="utf-8"?>
 <p:sld xmlns:a="http://schemas.openxmlformats.org/drawingml/2006/main" xmlns:r="http://schemas.openxmlformats.org/officeDocument/2006/relationships" xmlns:p="http://schemas.openxmlformats.org/presentationml/2006/main">
   <p:cSld>
     <p:spTree>

</xml_diff>